<commit_message>
updated program and ppt
</commit_message>
<xml_diff>
--- a/LMS Presentation.pptx
+++ b/LMS Presentation.pptx
@@ -113,6 +113,11 @@
       </a:defRPr>
     </a:lvl9pPr>
   </p:defaultTextStyle>
+  <p:extLst>
+    <p:ext uri="{EFAFB233-063F-42B5-8137-9DF3F51BA10A}">
+      <p15:sldGuideLst xmlns:p15="http://schemas.microsoft.com/office/powerpoint/2012/main"/>
+    </p:ext>
+  </p:extLst>
 </p:presentation>
 </file>
 
@@ -342,7 +347,7 @@
           <a:p>
             <a:fld id="{9B11D6FE-2E44-4F1F-A648-C1712B73FC8D}" type="datetimeFigureOut">
               <a:rPr lang="en-US" smtClean="0"/>
-              <a:t>3/20/2019</a:t>
+              <a:t>4/25/2019</a:t>
             </a:fld>
             <a:endParaRPr lang="en-US"/>
           </a:p>
@@ -550,7 +555,7 @@
           <a:p>
             <a:fld id="{9B11D6FE-2E44-4F1F-A648-C1712B73FC8D}" type="datetimeFigureOut">
               <a:rPr lang="en-US" smtClean="0"/>
-              <a:t>3/20/2019</a:t>
+              <a:t>4/25/2019</a:t>
             </a:fld>
             <a:endParaRPr lang="en-US"/>
           </a:p>
@@ -806,7 +811,7 @@
           <a:p>
             <a:fld id="{9B11D6FE-2E44-4F1F-A648-C1712B73FC8D}" type="datetimeFigureOut">
               <a:rPr lang="en-US" smtClean="0"/>
-              <a:t>3/20/2019</a:t>
+              <a:t>4/25/2019</a:t>
             </a:fld>
             <a:endParaRPr lang="en-US"/>
           </a:p>
@@ -980,7 +985,7 @@
           <a:p>
             <a:fld id="{9B11D6FE-2E44-4F1F-A648-C1712B73FC8D}" type="datetimeFigureOut">
               <a:rPr lang="en-US" smtClean="0"/>
-              <a:t>3/20/2019</a:t>
+              <a:t>4/25/2019</a:t>
             </a:fld>
             <a:endParaRPr lang="en-US"/>
           </a:p>
@@ -1323,7 +1328,7 @@
           <a:p>
             <a:fld id="{9B11D6FE-2E44-4F1F-A648-C1712B73FC8D}" type="datetimeFigureOut">
               <a:rPr lang="en-US" smtClean="0"/>
-              <a:t>3/20/2019</a:t>
+              <a:t>4/25/2019</a:t>
             </a:fld>
             <a:endParaRPr lang="en-US"/>
           </a:p>
@@ -1598,7 +1603,7 @@
           <a:p>
             <a:fld id="{9B11D6FE-2E44-4F1F-A648-C1712B73FC8D}" type="datetimeFigureOut">
               <a:rPr lang="en-US" smtClean="0"/>
-              <a:t>3/20/2019</a:t>
+              <a:t>4/25/2019</a:t>
             </a:fld>
             <a:endParaRPr lang="en-US"/>
           </a:p>
@@ -1977,7 +1982,7 @@
           <a:p>
             <a:fld id="{9B11D6FE-2E44-4F1F-A648-C1712B73FC8D}" type="datetimeFigureOut">
               <a:rPr lang="en-US" smtClean="0"/>
-              <a:t>3/20/2019</a:t>
+              <a:t>4/25/2019</a:t>
             </a:fld>
             <a:endParaRPr lang="en-US"/>
           </a:p>
@@ -2095,7 +2100,7 @@
           <a:p>
             <a:fld id="{9B11D6FE-2E44-4F1F-A648-C1712B73FC8D}" type="datetimeFigureOut">
               <a:rPr lang="en-US" smtClean="0"/>
-              <a:t>3/20/2019</a:t>
+              <a:t>4/25/2019</a:t>
             </a:fld>
             <a:endParaRPr lang="en-US"/>
           </a:p>
@@ -2266,7 +2271,7 @@
           <a:p>
             <a:fld id="{9B11D6FE-2E44-4F1F-A648-C1712B73FC8D}" type="datetimeFigureOut">
               <a:rPr lang="en-US" smtClean="0"/>
-              <a:t>3/20/2019</a:t>
+              <a:t>4/25/2019</a:t>
             </a:fld>
             <a:endParaRPr lang="en-US"/>
           </a:p>
@@ -2620,7 +2625,7 @@
           <a:p>
             <a:fld id="{9B11D6FE-2E44-4F1F-A648-C1712B73FC8D}" type="datetimeFigureOut">
               <a:rPr lang="en-US" smtClean="0"/>
-              <a:t>3/20/2019</a:t>
+              <a:t>4/25/2019</a:t>
             </a:fld>
             <a:endParaRPr lang="en-US"/>
           </a:p>
@@ -3002,7 +3007,7 @@
           <a:p>
             <a:fld id="{9B11D6FE-2E44-4F1F-A648-C1712B73FC8D}" type="datetimeFigureOut">
               <a:rPr lang="en-US" smtClean="0"/>
-              <a:t>3/20/2019</a:t>
+              <a:t>4/25/2019</a:t>
             </a:fld>
             <a:endParaRPr lang="en-US"/>
           </a:p>
@@ -3289,7 +3294,7 @@
           <a:p>
             <a:fld id="{9B11D6FE-2E44-4F1F-A648-C1712B73FC8D}" type="datetimeFigureOut">
               <a:rPr lang="en-US" smtClean="0"/>
-              <a:t>3/20/2019</a:t>
+              <a:t>4/25/2019</a:t>
             </a:fld>
             <a:endParaRPr lang="en-US"/>
           </a:p>
@@ -3958,7 +3963,7 @@
           <a:p>
             <a:r>
               <a:rPr lang="en-US" dirty="0"/>
-              <a:t>Future Plans</a:t>
+              <a:t>Execution</a:t>
             </a:r>
           </a:p>
         </p:txBody>
@@ -3984,40 +3989,6 @@
           <a:bodyPr/>
           <a:lstStyle/>
           <a:p>
-            <a:pPr>
-              <a:buFont typeface="Wingdings" panose="05000000000000000000" pitchFamily="2" charset="2"/>
-              <a:buChar char="Ø"/>
-            </a:pPr>
-            <a:endParaRPr lang="en-US" dirty="0"/>
-          </a:p>
-          <a:p>
-            <a:pPr>
-              <a:buFont typeface="Wingdings" panose="05000000000000000000" pitchFamily="2" charset="2"/>
-              <a:buChar char="Ø"/>
-            </a:pPr>
-            <a:endParaRPr lang="en-US" dirty="0"/>
-          </a:p>
-          <a:p>
-            <a:pPr>
-              <a:buFont typeface="Wingdings" panose="05000000000000000000" pitchFamily="2" charset="2"/>
-              <a:buChar char="Ø"/>
-            </a:pPr>
-            <a:r>
-              <a:rPr lang="en-US" sz="2400" dirty="0"/>
-              <a:t>Implementation of project</a:t>
-            </a:r>
-          </a:p>
-          <a:p>
-            <a:pPr lvl="1">
-              <a:buFont typeface="Wingdings" panose="05000000000000000000" pitchFamily="2" charset="2"/>
-              <a:buChar char="Ø"/>
-            </a:pPr>
-            <a:r>
-              <a:rPr lang="en-US" sz="2400" dirty="0"/>
-              <a:t>Coding in Visual Studio using C# language</a:t>
-            </a:r>
-          </a:p>
-          <a:p>
             <a:pPr lvl="1">
               <a:buFont typeface="Wingdings" panose="05000000000000000000" pitchFamily="2" charset="2"/>
               <a:buChar char="Ø"/>
@@ -4031,7 +4002,17 @@
             </a:pPr>
             <a:r>
               <a:rPr lang="en-US" sz="2400" dirty="0"/>
-              <a:t>Final Presentation</a:t>
+              <a:t>Project coded in C# using Visual Studio Window Form Application</a:t>
+            </a:r>
+          </a:p>
+          <a:p>
+            <a:pPr>
+              <a:buFont typeface="Wingdings" panose="05000000000000000000" pitchFamily="2" charset="2"/>
+              <a:buChar char="Ø"/>
+            </a:pPr>
+            <a:r>
+              <a:rPr lang="en-US" sz="2400" dirty="0"/>
+              <a:t>Used Microsoft SQL Server 2017 RDBMS for Database </a:t>
             </a:r>
           </a:p>
         </p:txBody>

</xml_diff>